<commit_message>
Fix where item not in list is not shown
</commit_message>
<xml_diff>
--- a/icon/icon.pptx
+++ b/icon/icon.pptx
@@ -6,6 +6,7 @@
   </p:sldMasterIdLst>
   <p:sldIdLst>
     <p:sldId id="256" r:id="rId2"/>
+    <p:sldId id="257" r:id="rId3"/>
   </p:sldIdLst>
   <p:sldSz cx="9144000" cy="6858000" type="screen4x3"/>
   <p:notesSz cx="6858000" cy="9144000"/>
@@ -288,7 +289,7 @@
           <a:p>
             <a:fld id="{B813467E-8AE8-4F4D-B376-D618B1454A4E}" type="datetimeFigureOut">
               <a:rPr lang="en-US" smtClean="0"/>
-              <a:t>30/4/18</a:t>
+              <a:t>6/5/18</a:t>
             </a:fld>
             <a:endParaRPr lang="en-US"/>
           </a:p>
@@ -458,7 +459,7 @@
           <a:p>
             <a:fld id="{B813467E-8AE8-4F4D-B376-D618B1454A4E}" type="datetimeFigureOut">
               <a:rPr lang="en-US" smtClean="0"/>
-              <a:t>30/4/18</a:t>
+              <a:t>6/5/18</a:t>
             </a:fld>
             <a:endParaRPr lang="en-US"/>
           </a:p>
@@ -638,7 +639,7 @@
           <a:p>
             <a:fld id="{B813467E-8AE8-4F4D-B376-D618B1454A4E}" type="datetimeFigureOut">
               <a:rPr lang="en-US" smtClean="0"/>
-              <a:t>30/4/18</a:t>
+              <a:t>6/5/18</a:t>
             </a:fld>
             <a:endParaRPr lang="en-US"/>
           </a:p>
@@ -808,7 +809,7 @@
           <a:p>
             <a:fld id="{B813467E-8AE8-4F4D-B376-D618B1454A4E}" type="datetimeFigureOut">
               <a:rPr lang="en-US" smtClean="0"/>
-              <a:t>30/4/18</a:t>
+              <a:t>6/5/18</a:t>
             </a:fld>
             <a:endParaRPr lang="en-US"/>
           </a:p>
@@ -1054,7 +1055,7 @@
           <a:p>
             <a:fld id="{B813467E-8AE8-4F4D-B376-D618B1454A4E}" type="datetimeFigureOut">
               <a:rPr lang="en-US" smtClean="0"/>
-              <a:t>30/4/18</a:t>
+              <a:t>6/5/18</a:t>
             </a:fld>
             <a:endParaRPr lang="en-US"/>
           </a:p>
@@ -1342,7 +1343,7 @@
           <a:p>
             <a:fld id="{B813467E-8AE8-4F4D-B376-D618B1454A4E}" type="datetimeFigureOut">
               <a:rPr lang="en-US" smtClean="0"/>
-              <a:t>30/4/18</a:t>
+              <a:t>6/5/18</a:t>
             </a:fld>
             <a:endParaRPr lang="en-US"/>
           </a:p>
@@ -1764,7 +1765,7 @@
           <a:p>
             <a:fld id="{B813467E-8AE8-4F4D-B376-D618B1454A4E}" type="datetimeFigureOut">
               <a:rPr lang="en-US" smtClean="0"/>
-              <a:t>30/4/18</a:t>
+              <a:t>6/5/18</a:t>
             </a:fld>
             <a:endParaRPr lang="en-US"/>
           </a:p>
@@ -1882,7 +1883,7 @@
           <a:p>
             <a:fld id="{B813467E-8AE8-4F4D-B376-D618B1454A4E}" type="datetimeFigureOut">
               <a:rPr lang="en-US" smtClean="0"/>
-              <a:t>30/4/18</a:t>
+              <a:t>6/5/18</a:t>
             </a:fld>
             <a:endParaRPr lang="en-US"/>
           </a:p>
@@ -1977,7 +1978,7 @@
           <a:p>
             <a:fld id="{B813467E-8AE8-4F4D-B376-D618B1454A4E}" type="datetimeFigureOut">
               <a:rPr lang="en-US" smtClean="0"/>
-              <a:t>30/4/18</a:t>
+              <a:t>6/5/18</a:t>
             </a:fld>
             <a:endParaRPr lang="en-US"/>
           </a:p>
@@ -2254,7 +2255,7 @@
           <a:p>
             <a:fld id="{B813467E-8AE8-4F4D-B376-D618B1454A4E}" type="datetimeFigureOut">
               <a:rPr lang="en-US" smtClean="0"/>
-              <a:t>30/4/18</a:t>
+              <a:t>6/5/18</a:t>
             </a:fld>
             <a:endParaRPr lang="en-US"/>
           </a:p>
@@ -2507,7 +2508,7 @@
           <a:p>
             <a:fld id="{B813467E-8AE8-4F4D-B376-D618B1454A4E}" type="datetimeFigureOut">
               <a:rPr lang="en-US" smtClean="0"/>
-              <a:t>30/4/18</a:t>
+              <a:t>6/5/18</a:t>
             </a:fld>
             <a:endParaRPr lang="en-US"/>
           </a:p>
@@ -2720,7 +2721,7 @@
           <a:p>
             <a:fld id="{B813467E-8AE8-4F4D-B376-D618B1454A4E}" type="datetimeFigureOut">
               <a:rPr lang="en-US" smtClean="0"/>
-              <a:t>30/4/18</a:t>
+              <a:t>6/5/18</a:t>
             </a:fld>
             <a:endParaRPr lang="en-US"/>
           </a:p>
@@ -3095,131 +3096,339 @@
           <a:chExt cx="0" cy="0"/>
         </a:xfrm>
       </p:grpSpPr>
-      <p:sp>
-        <p:nvSpPr>
-          <p:cNvPr id="5" name="Rounded Rectangle 4"/>
-          <p:cNvSpPr/>
+      <p:grpSp>
+        <p:nvGrpSpPr>
+          <p:cNvPr id="2" name="Group 1"/>
+          <p:cNvGrpSpPr/>
           <p:nvPr/>
-        </p:nvSpPr>
-        <p:spPr>
+        </p:nvGrpSpPr>
+        <p:grpSpPr>
           <a:xfrm>
             <a:off x="-313733" y="342000"/>
             <a:ext cx="13032000" cy="13032000"/>
+            <a:chOff x="-313733" y="342000"/>
+            <a:chExt cx="13032000" cy="13032000"/>
           </a:xfrm>
-          <a:prstGeom prst="roundRect">
-            <a:avLst/>
-          </a:prstGeom>
-          <a:solidFill>
-            <a:srgbClr val="26A65B"/>
-          </a:solidFill>
-          <a:ln>
+        </p:grpSpPr>
+        <p:sp>
+          <p:nvSpPr>
+            <p:cNvPr id="5" name="Rounded Rectangle 4"/>
+            <p:cNvSpPr/>
+            <p:nvPr/>
+          </p:nvSpPr>
+          <p:spPr>
+            <a:xfrm>
+              <a:off x="-313733" y="342000"/>
+              <a:ext cx="13032000" cy="13032000"/>
+            </a:xfrm>
+            <a:prstGeom prst="roundRect">
+              <a:avLst/>
+            </a:prstGeom>
+            <a:solidFill>
+              <a:srgbClr val="26A65B"/>
+            </a:solidFill>
+            <a:ln>
+              <a:solidFill>
+                <a:srgbClr val="26A65B"/>
+              </a:solidFill>
+            </a:ln>
+          </p:spPr>
+          <p:style>
+            <a:lnRef idx="1">
+              <a:schemeClr val="accent1"/>
+            </a:lnRef>
+            <a:fillRef idx="3">
+              <a:schemeClr val="accent1"/>
+            </a:fillRef>
+            <a:effectRef idx="2">
+              <a:schemeClr val="accent1"/>
+            </a:effectRef>
+            <a:fontRef idx="minor">
+              <a:schemeClr val="lt1"/>
+            </a:fontRef>
+          </p:style>
+          <p:txBody>
+            <a:bodyPr rtlCol="0" anchor="ctr"/>
+            <a:lstStyle/>
+            <a:p>
+              <a:pPr algn="ctr"/>
+              <a:endParaRPr lang="en-US" dirty="0"/>
+            </a:p>
+          </p:txBody>
+        </p:sp>
+        <p:sp>
+          <p:nvSpPr>
+            <p:cNvPr id="6" name="TextBox 5"/>
+            <p:cNvSpPr txBox="1"/>
+            <p:nvPr/>
+          </p:nvSpPr>
+          <p:spPr>
+            <a:xfrm>
+              <a:off x="2383126" y="7652402"/>
+              <a:ext cx="8877542" cy="3770263"/>
+            </a:xfrm>
+            <a:prstGeom prst="rect">
+              <a:avLst/>
+            </a:prstGeom>
             <a:noFill/>
-          </a:ln>
-        </p:spPr>
-        <p:style>
-          <a:lnRef idx="1">
-            <a:schemeClr val="accent1"/>
-          </a:lnRef>
-          <a:fillRef idx="3">
-            <a:schemeClr val="accent1"/>
-          </a:fillRef>
-          <a:effectRef idx="2">
-            <a:schemeClr val="accent1"/>
-          </a:effectRef>
-          <a:fontRef idx="minor">
-            <a:schemeClr val="lt1"/>
-          </a:fontRef>
-        </p:style>
-        <p:txBody>
-          <a:bodyPr rtlCol="0" anchor="ctr"/>
-          <a:lstStyle/>
-          <a:p>
-            <a:pPr algn="ctr"/>
-            <a:endParaRPr lang="en-US" dirty="0"/>
-          </a:p>
-        </p:txBody>
-      </p:sp>
-      <p:sp>
-        <p:nvSpPr>
-          <p:cNvPr id="6" name="TextBox 5"/>
-          <p:cNvSpPr txBox="1"/>
-          <p:nvPr/>
-        </p:nvSpPr>
-        <p:spPr>
-          <a:xfrm>
-            <a:off x="964958" y="7906402"/>
-            <a:ext cx="11502209" cy="3770263"/>
-          </a:xfrm>
-          <a:prstGeom prst="rect">
-            <a:avLst/>
-          </a:prstGeom>
-          <a:noFill/>
-        </p:spPr>
-        <p:txBody>
-          <a:bodyPr wrap="square" rtlCol="0">
-            <a:spAutoFit/>
-          </a:bodyPr>
-          <a:lstStyle/>
-          <a:p>
-            <a:r>
-              <a:rPr lang="en-US" sz="23900" b="1" dirty="0" smtClean="0">
+          </p:spPr>
+          <p:txBody>
+            <a:bodyPr wrap="square" rtlCol="0">
+              <a:spAutoFit/>
+            </a:bodyPr>
+            <a:lstStyle/>
+            <a:p>
+              <a:r>
+                <a:rPr lang="en-US" sz="23900" b="1" dirty="0" smtClean="0">
+                  <a:solidFill>
+                    <a:schemeClr val="bg1"/>
+                  </a:solidFill>
+                  <a:latin typeface="Harabara Mais Demo"/>
+                  <a:cs typeface="Harabara Mais Demo"/>
+                </a:rPr>
+                <a:t>Halal?</a:t>
+              </a:r>
+              <a:endParaRPr lang="en-US" sz="23900" b="1" dirty="0">
                 <a:solidFill>
-                  <a:schemeClr val="bg1">
-                    <a:lumMod val="85000"/>
-                  </a:schemeClr>
+                  <a:schemeClr val="bg1"/>
                 </a:solidFill>
-                <a:latin typeface="Andale Mono"/>
-                <a:cs typeface="Andale Mono"/>
-              </a:rPr>
-              <a:t>Halal?</a:t>
-            </a:r>
-            <a:endParaRPr lang="en-US" sz="23900" b="1" dirty="0">
-              <a:solidFill>
-                <a:schemeClr val="bg1">
-                  <a:lumMod val="85000"/>
-                </a:schemeClr>
-              </a:solidFill>
-              <a:latin typeface="Andale Mono"/>
-              <a:cs typeface="Andale Mono"/>
-            </a:endParaRPr>
-          </a:p>
-        </p:txBody>
-      </p:sp>
-      <p:pic>
-        <p:nvPicPr>
-          <p:cNvPr id="9" name="Picture 8" descr="camera.png"/>
-          <p:cNvPicPr>
-            <a:picLocks noChangeAspect="1"/>
-          </p:cNvPicPr>
-          <p:nvPr/>
-        </p:nvPicPr>
-        <p:blipFill>
-          <a:blip r:embed="rId2">
-            <a:lum bright="70000" contrast="-70000"/>
-            <a:extLst>
-              <a:ext uri="{28A0092B-C50C-407E-A947-70E740481C1C}">
-                <a14:useLocalDpi xmlns:a14="http://schemas.microsoft.com/office/drawing/2010/main" val="0"/>
-              </a:ext>
-            </a:extLst>
-          </a:blip>
-          <a:stretch>
-            <a:fillRect/>
-          </a:stretch>
-        </p:blipFill>
-        <p:spPr>
-          <a:xfrm>
-            <a:off x="2787706" y="1343414"/>
-            <a:ext cx="6525630" cy="6525630"/>
-          </a:xfrm>
-          <a:prstGeom prst="rect">
-            <a:avLst/>
-          </a:prstGeom>
-        </p:spPr>
-      </p:pic>
+                <a:latin typeface="Harabara Mais Demo"/>
+                <a:cs typeface="Harabara Mais Demo"/>
+              </a:endParaRPr>
+            </a:p>
+          </p:txBody>
+        </p:sp>
+        <p:pic>
+          <p:nvPicPr>
+            <p:cNvPr id="9" name="Picture 8" descr="camera.png"/>
+            <p:cNvPicPr>
+              <a:picLocks noChangeAspect="1"/>
+            </p:cNvPicPr>
+            <p:nvPr/>
+          </p:nvPicPr>
+          <p:blipFill>
+            <a:blip r:embed="rId2">
+              <a:lum bright="70000" contrast="-70000"/>
+              <a:extLst>
+                <a:ext uri="{BEBA8EAE-BF5A-486C-A8C5-ECC9F3942E4B}">
+                  <a14:imgProps xmlns:a14="http://schemas.microsoft.com/office/drawing/2010/main">
+                    <a14:imgLayer r:embed="rId3">
+                      <a14:imgEffect>
+                        <a14:artisticPaintStrokes/>
+                      </a14:imgEffect>
+                    </a14:imgLayer>
+                  </a14:imgProps>
+                </a:ext>
+                <a:ext uri="{28A0092B-C50C-407E-A947-70E740481C1C}">
+                  <a14:useLocalDpi xmlns:a14="http://schemas.microsoft.com/office/drawing/2010/main" val="0"/>
+                </a:ext>
+              </a:extLst>
+            </a:blip>
+            <a:stretch>
+              <a:fillRect/>
+            </a:stretch>
+          </p:blipFill>
+          <p:spPr>
+            <a:xfrm>
+              <a:off x="2787706" y="1343414"/>
+              <a:ext cx="6525630" cy="6525630"/>
+            </a:xfrm>
+            <a:prstGeom prst="rect">
+              <a:avLst/>
+            </a:prstGeom>
+          </p:spPr>
+        </p:pic>
+      </p:grpSp>
     </p:spTree>
     <p:extLst>
       <p:ext uri="{BB962C8B-B14F-4D97-AF65-F5344CB8AC3E}">
         <p14:creationId xmlns:p14="http://schemas.microsoft.com/office/powerpoint/2010/main" val="1850253105"/>
+      </p:ext>
+    </p:extLst>
+  </p:cSld>
+  <p:clrMapOvr>
+    <a:masterClrMapping/>
+  </p:clrMapOvr>
+  <p:timing>
+    <p:tnLst>
+      <p:par>
+        <p:cTn xmlns:p14="http://schemas.microsoft.com/office/powerpoint/2010/main" id="1" dur="indefinite" restart="never" nodeType="tmRoot"/>
+      </p:par>
+    </p:tnLst>
+  </p:timing>
+</p:sld>
+</file>
+
+<file path=ppt/slides/slide2.xml><?xml version="1.0" encoding="utf-8"?>
+<p:sld xmlns:a="http://schemas.openxmlformats.org/drawingml/2006/main" xmlns:r="http://schemas.openxmlformats.org/officeDocument/2006/relationships" xmlns:p="http://schemas.openxmlformats.org/presentationml/2006/main">
+  <p:cSld>
+    <p:spTree>
+      <p:nvGrpSpPr>
+        <p:cNvPr id="1" name=""/>
+        <p:cNvGrpSpPr/>
+        <p:nvPr/>
+      </p:nvGrpSpPr>
+      <p:grpSpPr>
+        <a:xfrm>
+          <a:off x="0" y="0"/>
+          <a:ext cx="0" cy="0"/>
+          <a:chOff x="0" y="0"/>
+          <a:chExt cx="0" cy="0"/>
+        </a:xfrm>
+      </p:grpSpPr>
+      <p:grpSp>
+        <p:nvGrpSpPr>
+          <p:cNvPr id="4" name="Group 3"/>
+          <p:cNvGrpSpPr>
+            <a:grpSpLocks noChangeAspect="1"/>
+          </p:cNvGrpSpPr>
+          <p:nvPr/>
+        </p:nvGrpSpPr>
+        <p:grpSpPr>
+          <a:xfrm>
+            <a:off x="-3395664" y="-580630"/>
+            <a:ext cx="16200000" cy="16200000"/>
+            <a:chOff x="-1345957" y="487901"/>
+            <a:chExt cx="13032000" cy="13032000"/>
+          </a:xfrm>
+        </p:grpSpPr>
+        <p:sp>
+          <p:nvSpPr>
+            <p:cNvPr id="5" name="Rounded Rectangle 4"/>
+            <p:cNvSpPr/>
+            <p:nvPr/>
+          </p:nvSpPr>
+          <p:spPr>
+            <a:xfrm>
+              <a:off x="-1345957" y="487901"/>
+              <a:ext cx="13032000" cy="13032000"/>
+            </a:xfrm>
+            <a:prstGeom prst="roundRect">
+              <a:avLst/>
+            </a:prstGeom>
+            <a:solidFill>
+              <a:srgbClr val="26A65B"/>
+            </a:solidFill>
+            <a:ln>
+              <a:solidFill>
+                <a:srgbClr val="26A65B"/>
+              </a:solidFill>
+            </a:ln>
+          </p:spPr>
+          <p:style>
+            <a:lnRef idx="1">
+              <a:schemeClr val="accent1"/>
+            </a:lnRef>
+            <a:fillRef idx="3">
+              <a:schemeClr val="accent1"/>
+            </a:fillRef>
+            <a:effectRef idx="2">
+              <a:schemeClr val="accent1"/>
+            </a:effectRef>
+            <a:fontRef idx="minor">
+              <a:schemeClr val="lt1"/>
+            </a:fontRef>
+          </p:style>
+          <p:txBody>
+            <a:bodyPr rtlCol="0" anchor="ctr"/>
+            <a:lstStyle/>
+            <a:p>
+              <a:pPr algn="ctr"/>
+              <a:endParaRPr lang="en-US" dirty="0"/>
+            </a:p>
+          </p:txBody>
+        </p:sp>
+        <p:sp>
+          <p:nvSpPr>
+            <p:cNvPr id="6" name="TextBox 5"/>
+            <p:cNvSpPr txBox="1"/>
+            <p:nvPr/>
+          </p:nvSpPr>
+          <p:spPr>
+            <a:xfrm>
+              <a:off x="-835194" y="7532385"/>
+              <a:ext cx="12326594" cy="5186993"/>
+            </a:xfrm>
+            <a:prstGeom prst="rect">
+              <a:avLst/>
+            </a:prstGeom>
+            <a:noFill/>
+          </p:spPr>
+          <p:txBody>
+            <a:bodyPr wrap="square" rtlCol="0">
+              <a:spAutoFit/>
+            </a:bodyPr>
+            <a:lstStyle/>
+            <a:p>
+              <a:pPr algn="ctr"/>
+              <a:r>
+                <a:rPr lang="en-US" sz="41300" b="1" dirty="0" smtClean="0">
+                  <a:solidFill>
+                    <a:schemeClr val="bg1"/>
+                  </a:solidFill>
+                  <a:latin typeface="Hobo Std"/>
+                  <a:cs typeface="Hobo Std"/>
+                </a:rPr>
+                <a:t>Halal?</a:t>
+              </a:r>
+              <a:endParaRPr lang="en-US" sz="41300" b="1" dirty="0">
+                <a:solidFill>
+                  <a:schemeClr val="bg1"/>
+                </a:solidFill>
+                <a:latin typeface="Hobo Std"/>
+                <a:cs typeface="Hobo Std"/>
+              </a:endParaRPr>
+            </a:p>
+          </p:txBody>
+        </p:sp>
+        <p:pic>
+          <p:nvPicPr>
+            <p:cNvPr id="9" name="Picture 8" descr="camera.png"/>
+            <p:cNvPicPr>
+              <a:picLocks noChangeAspect="1"/>
+            </p:cNvPicPr>
+            <p:nvPr/>
+          </p:nvPicPr>
+          <p:blipFill>
+            <a:blip r:embed="rId2">
+              <a:lum bright="70000" contrast="-70000"/>
+              <a:extLst>
+                <a:ext uri="{BEBA8EAE-BF5A-486C-A8C5-ECC9F3942E4B}">
+                  <a14:imgProps xmlns:a14="http://schemas.microsoft.com/office/drawing/2010/main">
+                    <a14:imgLayer r:embed="rId3">
+                      <a14:imgEffect>
+                        <a14:artisticPaintStrokes/>
+                      </a14:imgEffect>
+                      <a14:imgEffect>
+                        <a14:sharpenSoften amount="50000"/>
+                      </a14:imgEffect>
+                    </a14:imgLayer>
+                  </a14:imgProps>
+                </a:ext>
+                <a:ext uri="{28A0092B-C50C-407E-A947-70E740481C1C}">
+                  <a14:useLocalDpi xmlns:a14="http://schemas.microsoft.com/office/drawing/2010/main" val="0"/>
+                </a:ext>
+              </a:extLst>
+            </a:blip>
+            <a:stretch>
+              <a:fillRect/>
+            </a:stretch>
+          </p:blipFill>
+          <p:spPr>
+            <a:xfrm>
+              <a:off x="1912123" y="1343414"/>
+              <a:ext cx="6525630" cy="6525630"/>
+            </a:xfrm>
+            <a:prstGeom prst="rect">
+              <a:avLst/>
+            </a:prstGeom>
+          </p:spPr>
+        </p:pic>
+      </p:grpSp>
+    </p:spTree>
+    <p:extLst>
+      <p:ext uri="{BB962C8B-B14F-4D97-AF65-F5344CB8AC3E}">
+        <p14:creationId xmlns:p14="http://schemas.microsoft.com/office/powerpoint/2010/main" val="1689160947"/>
       </p:ext>
     </p:extLst>
   </p:cSld>

</xml_diff>